<commit_message>
Update README with project links to GitHub, Hugging Face, and Kaggle for enhanced accessibility. Update presentation file for Stellar Object Detection with new content.
</commit_message>
<xml_diff>
--- a/Presentation/Stellar_Object_Detection_Capstone_PPT.pptx
+++ b/Presentation/Stellar_Object_Detection_Capstone_PPT.pptx
@@ -140,7 +140,7 @@
   <pc:docChgLst>
     <pc:chgData name="Shakil Ansari" userId="4258b2f02d46b9e3" providerId="LiveId" clId="{9D7872A3-76B9-4A73-B781-6A1D03B39EB7}"/>
     <pc:docChg chg="undo custSel addSld delSld modSld sldOrd">
-      <pc:chgData name="Shakil Ansari" userId="4258b2f02d46b9e3" providerId="LiveId" clId="{9D7872A3-76B9-4A73-B781-6A1D03B39EB7}" dt="2025-07-13T19:06:21.094" v="859" actId="14100"/>
+      <pc:chgData name="Shakil Ansari" userId="4258b2f02d46b9e3" providerId="LiveId" clId="{9D7872A3-76B9-4A73-B781-6A1D03B39EB7}" dt="2025-07-15T15:21:00.875" v="937" actId="20577"/>
       <pc:docMkLst>
         <pc:docMk/>
       </pc:docMkLst>
@@ -247,78 +247,6 @@
             <pc:docMk/>
             <pc:sldMk cId="1953804542" sldId="714"/>
             <ac:spMk id="3" creationId="{67B003C9-103A-47E6-D7EB-87D0A8CB5431}"/>
-          </ac:spMkLst>
-        </pc:spChg>
-        <pc:spChg chg="add">
-          <ac:chgData name="Shakil Ansari" userId="4258b2f02d46b9e3" providerId="LiveId" clId="{9D7872A3-76B9-4A73-B781-6A1D03B39EB7}" dt="2025-07-13T18:58:00.555" v="551"/>
-          <ac:spMkLst>
-            <pc:docMk/>
-            <pc:sldMk cId="1953804542" sldId="714"/>
-            <ac:spMk id="4" creationId="{42AFA6F1-7C3D-8E3D-136D-63B1C3123E6E}"/>
-          </ac:spMkLst>
-        </pc:spChg>
-        <pc:spChg chg="add">
-          <ac:chgData name="Shakil Ansari" userId="4258b2f02d46b9e3" providerId="LiveId" clId="{9D7872A3-76B9-4A73-B781-6A1D03B39EB7}" dt="2025-07-13T18:58:00.555" v="551"/>
-          <ac:spMkLst>
-            <pc:docMk/>
-            <pc:sldMk cId="1953804542" sldId="714"/>
-            <ac:spMk id="5" creationId="{B3C3EF3F-BCEB-0892-3E7C-EC68C8E991FD}"/>
-          </ac:spMkLst>
-        </pc:spChg>
-        <pc:spChg chg="add">
-          <ac:chgData name="Shakil Ansari" userId="4258b2f02d46b9e3" providerId="LiveId" clId="{9D7872A3-76B9-4A73-B781-6A1D03B39EB7}" dt="2025-07-13T18:58:00.555" v="551"/>
-          <ac:spMkLst>
-            <pc:docMk/>
-            <pc:sldMk cId="1953804542" sldId="714"/>
-            <ac:spMk id="6" creationId="{3D5E535C-6CA8-49AE-91C1-187F97FB0B9D}"/>
-          </ac:spMkLst>
-        </pc:spChg>
-        <pc:spChg chg="add">
-          <ac:chgData name="Shakil Ansari" userId="4258b2f02d46b9e3" providerId="LiveId" clId="{9D7872A3-76B9-4A73-B781-6A1D03B39EB7}" dt="2025-07-13T18:58:00.555" v="551"/>
-          <ac:spMkLst>
-            <pc:docMk/>
-            <pc:sldMk cId="1953804542" sldId="714"/>
-            <ac:spMk id="7" creationId="{2C9F989A-9477-C72A-F66D-E654B618B4CD}"/>
-          </ac:spMkLst>
-        </pc:spChg>
-        <pc:spChg chg="add">
-          <ac:chgData name="Shakil Ansari" userId="4258b2f02d46b9e3" providerId="LiveId" clId="{9D7872A3-76B9-4A73-B781-6A1D03B39EB7}" dt="2025-07-13T18:58:00.555" v="551"/>
-          <ac:spMkLst>
-            <pc:docMk/>
-            <pc:sldMk cId="1953804542" sldId="714"/>
-            <ac:spMk id="8" creationId="{DBBC43F5-616B-947E-0CD6-0D62E218E7D9}"/>
-          </ac:spMkLst>
-        </pc:spChg>
-        <pc:spChg chg="add">
-          <ac:chgData name="Shakil Ansari" userId="4258b2f02d46b9e3" providerId="LiveId" clId="{9D7872A3-76B9-4A73-B781-6A1D03B39EB7}" dt="2025-07-13T18:58:44.049" v="556"/>
-          <ac:spMkLst>
-            <pc:docMk/>
-            <pc:sldMk cId="1953804542" sldId="714"/>
-            <ac:spMk id="9" creationId="{339B670D-C445-FAE2-2214-E811086F85DF}"/>
-          </ac:spMkLst>
-        </pc:spChg>
-        <pc:spChg chg="add mod">
-          <ac:chgData name="Shakil Ansari" userId="4258b2f02d46b9e3" providerId="LiveId" clId="{9D7872A3-76B9-4A73-B781-6A1D03B39EB7}" dt="2025-07-13T18:59:00.856" v="558"/>
-          <ac:spMkLst>
-            <pc:docMk/>
-            <pc:sldMk cId="1953804542" sldId="714"/>
-            <ac:spMk id="10" creationId="{6023F9CE-058A-4C1A-DF18-00A0EBD9C3EF}"/>
-          </ac:spMkLst>
-        </pc:spChg>
-        <pc:spChg chg="add del mod">
-          <ac:chgData name="Shakil Ansari" userId="4258b2f02d46b9e3" providerId="LiveId" clId="{9D7872A3-76B9-4A73-B781-6A1D03B39EB7}" dt="2025-07-13T18:59:42.455" v="637" actId="21"/>
-          <ac:spMkLst>
-            <pc:docMk/>
-            <pc:sldMk cId="1953804542" sldId="714"/>
-            <ac:spMk id="11" creationId="{AED51FC6-1584-A036-8F4B-2D17CB39AC70}"/>
-          </ac:spMkLst>
-        </pc:spChg>
-        <pc:spChg chg="add mod">
-          <ac:chgData name="Shakil Ansari" userId="4258b2f02d46b9e3" providerId="LiveId" clId="{9D7872A3-76B9-4A73-B781-6A1D03B39EB7}" dt="2025-07-13T18:59:38.008" v="634"/>
-          <ac:spMkLst>
-            <pc:docMk/>
-            <pc:sldMk cId="1953804542" sldId="714"/>
-            <ac:spMk id="12" creationId="{AED51FC6-1584-A036-8F4B-2D17CB39AC70}"/>
           </ac:spMkLst>
         </pc:spChg>
       </pc:sldChg>
@@ -437,13 +365,13 @@
         </pc:picChg>
       </pc:sldChg>
       <pc:sldChg chg="modSp mod">
-        <pc:chgData name="Shakil Ansari" userId="4258b2f02d46b9e3" providerId="LiveId" clId="{9D7872A3-76B9-4A73-B781-6A1D03B39EB7}" dt="2025-07-10T20:09:51.116" v="402" actId="20577"/>
+        <pc:chgData name="Shakil Ansari" userId="4258b2f02d46b9e3" providerId="LiveId" clId="{9D7872A3-76B9-4A73-B781-6A1D03B39EB7}" dt="2025-07-15T15:21:00.875" v="937" actId="20577"/>
         <pc:sldMkLst>
           <pc:docMk/>
           <pc:sldMk cId="2703871255" sldId="728"/>
         </pc:sldMkLst>
         <pc:spChg chg="mod">
-          <ac:chgData name="Shakil Ansari" userId="4258b2f02d46b9e3" providerId="LiveId" clId="{9D7872A3-76B9-4A73-B781-6A1D03B39EB7}" dt="2025-07-10T20:09:51.116" v="402" actId="20577"/>
+          <ac:chgData name="Shakil Ansari" userId="4258b2f02d46b9e3" providerId="LiveId" clId="{9D7872A3-76B9-4A73-B781-6A1D03B39EB7}" dt="2025-07-15T15:21:00.875" v="937" actId="20577"/>
           <ac:spMkLst>
             <pc:docMk/>
             <pc:sldMk cId="2703871255" sldId="728"/>
@@ -471,86 +399,6 @@
             <pc:docMk/>
             <pc:sldMk cId="1244476586" sldId="729"/>
             <ac:spMk id="3" creationId="{00000000-0000-0000-0000-000000000000}"/>
-          </ac:spMkLst>
-        </pc:spChg>
-        <pc:spChg chg="add">
-          <ac:chgData name="Shakil Ansari" userId="4258b2f02d46b9e3" providerId="LiveId" clId="{9D7872A3-76B9-4A73-B781-6A1D03B39EB7}" dt="2025-07-13T18:52:48.961" v="508"/>
-          <ac:spMkLst>
-            <pc:docMk/>
-            <pc:sldMk cId="1244476586" sldId="729"/>
-            <ac:spMk id="4" creationId="{ACCE82C9-4642-6059-52CC-1D6EEA3B1992}"/>
-          </ac:spMkLst>
-        </pc:spChg>
-        <pc:spChg chg="add">
-          <ac:chgData name="Shakil Ansari" userId="4258b2f02d46b9e3" providerId="LiveId" clId="{9D7872A3-76B9-4A73-B781-6A1D03B39EB7}" dt="2025-07-13T18:52:48.961" v="508"/>
-          <ac:spMkLst>
-            <pc:docMk/>
-            <pc:sldMk cId="1244476586" sldId="729"/>
-            <ac:spMk id="5" creationId="{B7B238D9-B4D3-2CF3-A573-7E47D252461A}"/>
-          </ac:spMkLst>
-        </pc:spChg>
-        <pc:spChg chg="add">
-          <ac:chgData name="Shakil Ansari" userId="4258b2f02d46b9e3" providerId="LiveId" clId="{9D7872A3-76B9-4A73-B781-6A1D03B39EB7}" dt="2025-07-13T18:52:48.961" v="508"/>
-          <ac:spMkLst>
-            <pc:docMk/>
-            <pc:sldMk cId="1244476586" sldId="729"/>
-            <ac:spMk id="6" creationId="{10CCAA42-29BE-7504-E77F-1CC34C6B5004}"/>
-          </ac:spMkLst>
-        </pc:spChg>
-        <pc:spChg chg="add">
-          <ac:chgData name="Shakil Ansari" userId="4258b2f02d46b9e3" providerId="LiveId" clId="{9D7872A3-76B9-4A73-B781-6A1D03B39EB7}" dt="2025-07-13T18:52:48.961" v="508"/>
-          <ac:spMkLst>
-            <pc:docMk/>
-            <pc:sldMk cId="1244476586" sldId="729"/>
-            <ac:spMk id="7" creationId="{25DC0012-F148-19C0-7E7F-F9D19E601C20}"/>
-          </ac:spMkLst>
-        </pc:spChg>
-        <pc:spChg chg="add">
-          <ac:chgData name="Shakil Ansari" userId="4258b2f02d46b9e3" providerId="LiveId" clId="{9D7872A3-76B9-4A73-B781-6A1D03B39EB7}" dt="2025-07-13T18:52:48.961" v="508"/>
-          <ac:spMkLst>
-            <pc:docMk/>
-            <pc:sldMk cId="1244476586" sldId="729"/>
-            <ac:spMk id="8" creationId="{C5E09014-49C1-8FCB-74F7-EB0793CEF7CC}"/>
-          </ac:spMkLst>
-        </pc:spChg>
-        <pc:spChg chg="add">
-          <ac:chgData name="Shakil Ansari" userId="4258b2f02d46b9e3" providerId="LiveId" clId="{9D7872A3-76B9-4A73-B781-6A1D03B39EB7}" dt="2025-07-13T18:53:53.948" v="525"/>
-          <ac:spMkLst>
-            <pc:docMk/>
-            <pc:sldMk cId="1244476586" sldId="729"/>
-            <ac:spMk id="9" creationId="{42D89011-7D6F-759C-8396-2D897F75D672}"/>
-          </ac:spMkLst>
-        </pc:spChg>
-        <pc:spChg chg="add">
-          <ac:chgData name="Shakil Ansari" userId="4258b2f02d46b9e3" providerId="LiveId" clId="{9D7872A3-76B9-4A73-B781-6A1D03B39EB7}" dt="2025-07-13T18:53:53.948" v="525"/>
-          <ac:spMkLst>
-            <pc:docMk/>
-            <pc:sldMk cId="1244476586" sldId="729"/>
-            <ac:spMk id="10" creationId="{D696776D-C1E9-BEF6-1804-33BEA82828B1}"/>
-          </ac:spMkLst>
-        </pc:spChg>
-        <pc:spChg chg="add">
-          <ac:chgData name="Shakil Ansari" userId="4258b2f02d46b9e3" providerId="LiveId" clId="{9D7872A3-76B9-4A73-B781-6A1D03B39EB7}" dt="2025-07-13T18:53:53.948" v="525"/>
-          <ac:spMkLst>
-            <pc:docMk/>
-            <pc:sldMk cId="1244476586" sldId="729"/>
-            <ac:spMk id="11" creationId="{3BCD0E9D-BB92-F0ED-31D9-D2C16C341415}"/>
-          </ac:spMkLst>
-        </pc:spChg>
-        <pc:spChg chg="add">
-          <ac:chgData name="Shakil Ansari" userId="4258b2f02d46b9e3" providerId="LiveId" clId="{9D7872A3-76B9-4A73-B781-6A1D03B39EB7}" dt="2025-07-13T18:53:53.948" v="525"/>
-          <ac:spMkLst>
-            <pc:docMk/>
-            <pc:sldMk cId="1244476586" sldId="729"/>
-            <ac:spMk id="12" creationId="{004B608F-4F7D-676E-E352-6D8C05CBF122}"/>
-          </ac:spMkLst>
-        </pc:spChg>
-        <pc:spChg chg="add">
-          <ac:chgData name="Shakil Ansari" userId="4258b2f02d46b9e3" providerId="LiveId" clId="{9D7872A3-76B9-4A73-B781-6A1D03B39EB7}" dt="2025-07-13T18:53:53.948" v="525"/>
-          <ac:spMkLst>
-            <pc:docMk/>
-            <pc:sldMk cId="1244476586" sldId="729"/>
-            <ac:spMk id="13" creationId="{C37E7B32-6E69-89CA-22CC-FD29E29D66E4}"/>
           </ac:spMkLst>
         </pc:spChg>
       </pc:sldChg>
@@ -583,46 +431,6 @@
           <pc:docMk/>
           <pc:sldMk cId="1871862226" sldId="731"/>
         </pc:sldMkLst>
-        <pc:spChg chg="add">
-          <ac:chgData name="Shakil Ansari" userId="4258b2f02d46b9e3" providerId="LiveId" clId="{9D7872A3-76B9-4A73-B781-6A1D03B39EB7}" dt="2025-07-13T18:55:42.613" v="529"/>
-          <ac:spMkLst>
-            <pc:docMk/>
-            <pc:sldMk cId="1871862226" sldId="731"/>
-            <ac:spMk id="4" creationId="{635CC98E-3CCE-DA47-CB30-1C4E0B1CE8E1}"/>
-          </ac:spMkLst>
-        </pc:spChg>
-        <pc:spChg chg="add">
-          <ac:chgData name="Shakil Ansari" userId="4258b2f02d46b9e3" providerId="LiveId" clId="{9D7872A3-76B9-4A73-B781-6A1D03B39EB7}" dt="2025-07-13T18:55:42.613" v="529"/>
-          <ac:spMkLst>
-            <pc:docMk/>
-            <pc:sldMk cId="1871862226" sldId="731"/>
-            <ac:spMk id="5" creationId="{902BF327-DB5B-A2A5-0861-77F1000EFE34}"/>
-          </ac:spMkLst>
-        </pc:spChg>
-        <pc:spChg chg="add">
-          <ac:chgData name="Shakil Ansari" userId="4258b2f02d46b9e3" providerId="LiveId" clId="{9D7872A3-76B9-4A73-B781-6A1D03B39EB7}" dt="2025-07-13T18:55:42.613" v="529"/>
-          <ac:spMkLst>
-            <pc:docMk/>
-            <pc:sldMk cId="1871862226" sldId="731"/>
-            <ac:spMk id="6" creationId="{29D90DC8-B03E-15A7-3659-82F7D8509723}"/>
-          </ac:spMkLst>
-        </pc:spChg>
-        <pc:spChg chg="add">
-          <ac:chgData name="Shakil Ansari" userId="4258b2f02d46b9e3" providerId="LiveId" clId="{9D7872A3-76B9-4A73-B781-6A1D03B39EB7}" dt="2025-07-13T18:55:42.613" v="529"/>
-          <ac:spMkLst>
-            <pc:docMk/>
-            <pc:sldMk cId="1871862226" sldId="731"/>
-            <ac:spMk id="7" creationId="{E5182C41-8791-EC5C-1A13-B6CF0AEB2ED5}"/>
-          </ac:spMkLst>
-        </pc:spChg>
-        <pc:spChg chg="add">
-          <ac:chgData name="Shakil Ansari" userId="4258b2f02d46b9e3" providerId="LiveId" clId="{9D7872A3-76B9-4A73-B781-6A1D03B39EB7}" dt="2025-07-13T18:55:42.613" v="529"/>
-          <ac:spMkLst>
-            <pc:docMk/>
-            <pc:sldMk cId="1871862226" sldId="731"/>
-            <ac:spMk id="8" creationId="{9A278C01-4793-EB24-A8F9-285E7750D3DF}"/>
-          </ac:spMkLst>
-        </pc:spChg>
       </pc:sldChg>
       <pc:sldChg chg="add del">
         <pc:chgData name="Shakil Ansari" userId="4258b2f02d46b9e3" providerId="LiveId" clId="{9D7872A3-76B9-4A73-B781-6A1D03B39EB7}" dt="2025-07-13T18:55:59.964" v="532" actId="2696"/>
@@ -725,7 +533,7 @@
           <a:p>
             <a:fld id="{C20077D8-B575-4753-B8FD-F5736649C91E}" type="datetimeFigureOut">
               <a:rPr lang="en-IN" smtClean="0"/>
-              <a:t>14-07-2025</a:t>
+              <a:t>15-07-2025</a:t>
             </a:fld>
             <a:endParaRPr lang="en-IN" dirty="0"/>
           </a:p>
@@ -6449,6 +6257,31 @@
                 <a:hlinkClick r:id="rId2"/>
               </a:rPr>
               <a:t>stellar_object_classification</a:t>
+            </a:r>
+            <a:endParaRPr lang="en-US" dirty="0"/>
+          </a:p>
+          <a:p>
+            <a:endParaRPr lang="en-US" dirty="0"/>
+          </a:p>
+          <a:p>
+            <a:r>
+              <a:rPr lang="en-US" dirty="0">
+                <a:hlinkClick r:id="rId3"/>
+              </a:rPr>
+              <a:t>Kaggle</a:t>
+            </a:r>
+            <a:endParaRPr lang="en-US" dirty="0"/>
+          </a:p>
+          <a:p>
+            <a:r>
+              <a:rPr lang="en-US" dirty="0" err="1">
+                <a:hlinkClick r:id="rId4"/>
+              </a:rPr>
+              <a:t>Huggingface</a:t>
+            </a:r>
+            <a:r>
+              <a:rPr lang="en-US"/>
+              <a:t> – Try Live Demo</a:t>
             </a:r>
             <a:endParaRPr lang="en-US" dirty="0"/>
           </a:p>

</xml_diff>